<commit_message>
Prefinal version of STEP 2023 April 5th
</commit_message>
<xml_diff>
--- a/Docs/Incidence matrix and OOP.pptx
+++ b/Docs/Incidence matrix and OOP.pptx
@@ -8492,7 +8492,7 @@
         <p:spPr>
           <a:xfrm>
             <a:off x="533400" y="4343400"/>
-            <a:ext cx="8153400" cy="2554545"/>
+            <a:ext cx="8153400" cy="2246769"/>
           </a:xfrm>
           <a:prstGeom prst="rect">
             <a:avLst/>
@@ -8593,7 +8593,11 @@
             </a:r>
             <a:r>
               <a:rPr lang="en-US" sz="2000" dirty="0" smtClean="0"/>
-              <a:t>MSV approach</a:t>
+              <a:t>MST </a:t>
+            </a:r>
+            <a:r>
+              <a:rPr lang="en-US" sz="2000" dirty="0" smtClean="0"/>
+              <a:t>approach</a:t>
             </a:r>
             <a:r>
               <a:rPr lang="en-US" sz="2000" dirty="0"/>
@@ -8605,14 +8609,12 @@
             </a:r>
             <a:r>
               <a:rPr lang="en-US" sz="2000" dirty="0"/>
-              <a:t> –&gt; direct access to EA</a:t>
-            </a:r>
-          </a:p>
-          <a:p>
-            <a:pPr marL="285750" indent="-285750">
-              <a:buFont typeface="Arial" panose="020B0604020202020204" pitchFamily="34" charset="0"/>
-              <a:buChar char="•"/>
-            </a:pPr>
+              <a:t> –&gt; direct access to </a:t>
+            </a:r>
+            <a:r>
+              <a:rPr lang="en-US" sz="2000" dirty="0" smtClean="0"/>
+              <a:t>EA</a:t>
+            </a:r>
             <a:endParaRPr lang="en-US" sz="2000" dirty="0"/>
           </a:p>
         </p:txBody>
@@ -9157,8 +9159,8 @@
         </p:nvSpPr>
         <p:spPr>
           <a:xfrm>
-            <a:off x="505722" y="5257800"/>
-            <a:ext cx="8153400" cy="1015663"/>
+            <a:off x="76200" y="5064919"/>
+            <a:ext cx="9067800" cy="1569660"/>
           </a:xfrm>
           <a:prstGeom prst="rect">
             <a:avLst/>
@@ -9176,15 +9178,15 @@
               <a:buChar char="•"/>
             </a:pPr>
             <a:r>
-              <a:rPr lang="en-US" sz="2000" dirty="0" smtClean="0"/>
+              <a:rPr lang="en-US" sz="2400" dirty="0" smtClean="0"/>
               <a:t>there will be difference in number of instructions and their nature for row and column based approaches for real assemblers! Row</a:t>
             </a:r>
             <a:r>
-              <a:rPr lang="en-US" sz="2000" dirty="0"/>
+              <a:rPr lang="en-US" sz="2400" dirty="0"/>
               <a:t>s</a:t>
             </a:r>
             <a:r>
-              <a:rPr lang="en-US" sz="2000" dirty="0" smtClean="0"/>
+              <a:rPr lang="en-US" sz="2400" dirty="0" smtClean="0"/>
               <a:t> are better</a:t>
             </a:r>
           </a:p>
@@ -9194,10 +9196,10 @@
               <a:buChar char="•"/>
             </a:pPr>
             <a:r>
-              <a:rPr lang="en-US" sz="2000" dirty="0" smtClean="0"/>
+              <a:rPr lang="en-US" sz="2400" dirty="0" smtClean="0"/>
               <a:t>matrix is sparse – how to keep direct access and get rid of empty cells</a:t>
             </a:r>
-            <a:endParaRPr lang="en-US" sz="2000" dirty="0"/>
+            <a:endParaRPr lang="en-US" sz="2400" dirty="0"/>
           </a:p>
         </p:txBody>
       </p:sp>
@@ -22596,10 +22598,11 @@
             <a:avLst/>
           </a:prstGeom>
           <a:noFill/>
-          <a:ln>
+          <a:ln w="34925">
             <a:solidFill>
               <a:srgbClr val="C00000"/>
             </a:solidFill>
+            <a:prstDash val="sysDash"/>
           </a:ln>
         </p:spPr>
         <p:style>
@@ -22642,10 +22645,11 @@
             <a:avLst/>
           </a:prstGeom>
           <a:noFill/>
-          <a:ln>
+          <a:ln w="34925">
             <a:solidFill>
               <a:srgbClr val="C00000"/>
             </a:solidFill>
+            <a:prstDash val="sysDash"/>
           </a:ln>
         </p:spPr>
         <p:style>
@@ -22688,10 +22692,11 @@
             <a:avLst/>
           </a:prstGeom>
           <a:noFill/>
-          <a:ln>
+          <a:ln w="34925">
             <a:solidFill>
               <a:srgbClr val="C00000"/>
             </a:solidFill>
+            <a:prstDash val="sysDash"/>
           </a:ln>
         </p:spPr>
         <p:style>
@@ -22727,8 +22732,8 @@
         </p:nvSpPr>
         <p:spPr>
           <a:xfrm>
-            <a:off x="5867400" y="2911260"/>
-            <a:ext cx="2895600" cy="1569660"/>
+            <a:off x="5867400" y="2424303"/>
+            <a:ext cx="3124200" cy="4154984"/>
           </a:xfrm>
           <a:prstGeom prst="rect">
             <a:avLst/>
@@ -22742,7 +22747,7 @@
           <a:lstStyle/>
           <a:p>
             <a:r>
-              <a:rPr lang="en-US" sz="2400" dirty="0" smtClean="0"/>
+              <a:rPr lang="en-US" sz="2400" u="sng" dirty="0" smtClean="0"/>
               <a:t>One new class:</a:t>
             </a:r>
           </a:p>
@@ -22764,6 +22769,23 @@
             <a:r>
               <a:rPr lang="en-US" sz="2400" dirty="0" smtClean="0"/>
               <a:t>Potentially several new columns</a:t>
+            </a:r>
+          </a:p>
+          <a:p>
+            <a:pPr marL="342900" indent="-342900">
+              <a:buFont typeface="Arial" panose="020B0604020202020204" pitchFamily="34" charset="0"/>
+              <a:buChar char="•"/>
+            </a:pPr>
+            <a:endParaRPr lang="en-US" sz="2400" dirty="0"/>
+          </a:p>
+          <a:p>
+            <a:r>
+              <a:rPr lang="en-US" sz="2400" u="sng" dirty="0" smtClean="0"/>
+              <a:t>Aim:</a:t>
+            </a:r>
+            <a:r>
+              <a:rPr lang="en-US" sz="2400" dirty="0" smtClean="0"/>
+              <a:t> no difference  between access to objects of classes known at compile time and ones loaded dynamically</a:t>
             </a:r>
             <a:endParaRPr lang="en-US" sz="2400" dirty="0"/>
           </a:p>
@@ -23124,14 +23146,20 @@
           <a:lstStyle/>
           <a:p>
             <a:r>
-              <a:rPr lang="en-US" sz="8000" b="1" dirty="0">
+              <a:rPr lang="en-US" sz="8000" b="1" dirty="0" smtClean="0">
                 <a:solidFill>
                   <a:srgbClr val="CC6600"/>
                 </a:solidFill>
                 <a:latin typeface="Comic Sans MS" pitchFamily="66" charset="0"/>
               </a:rPr>
-              <a:t>Appendix</a:t>
-            </a:r>
+              <a:t>Thank you ! Q&amp;A</a:t>
+            </a:r>
+            <a:endParaRPr lang="en-US" sz="8000" b="1" dirty="0">
+              <a:solidFill>
+                <a:srgbClr val="CC6600"/>
+              </a:solidFill>
+              <a:latin typeface="Comic Sans MS" pitchFamily="66" charset="0"/>
+            </a:endParaRPr>
           </a:p>
         </p:txBody>
       </p:sp>
@@ -23702,7 +23730,7 @@
               <a:rPr lang="en-US" sz="2400" u="sng" dirty="0" smtClean="0">
                 <a:sym typeface="Wingdings" panose="05000000000000000000" pitchFamily="2" charset="2"/>
               </a:rPr>
-              <a:t>Ready to fail – need your feedback!</a:t>
+              <a:t>Your feedback is welcome!</a:t>
             </a:r>
             <a:endParaRPr lang="en-US" sz="2400" dirty="0" smtClean="0"/>
           </a:p>
@@ -23940,7 +23968,15 @@
             </a:r>
             <a:r>
               <a:rPr lang="en-US" sz="2400" dirty="0" smtClean="0"/>
-              <a:t> – relation between classes implying all members of every parent ‘go down’ the child class. Base-derived, </a:t>
+              <a:t> – relation between classes implying all members of every parent ‘go down’ </a:t>
+            </a:r>
+            <a:r>
+              <a:rPr lang="en-US" sz="2400" dirty="0" smtClean="0"/>
+              <a:t>to the </a:t>
+            </a:r>
+            <a:r>
+              <a:rPr lang="en-US" sz="2400" dirty="0" smtClean="0"/>
+              <a:t>child class. Base-derived, </a:t>
             </a:r>
             <a:r>
               <a:rPr lang="en-US" sz="2400" dirty="0" err="1" smtClean="0"/>
@@ -28011,14 +28047,14 @@
           <p:nvPr>
             <p:extLst>
               <p:ext uri="{D42A27DB-BD31-4B8C-83A1-F6EECF244321}">
-                <p14:modId xmlns:p14="http://schemas.microsoft.com/office/powerpoint/2010/main" val="1091513260"/>
+                <p14:modId xmlns:p14="http://schemas.microsoft.com/office/powerpoint/2010/main" val="2744676125"/>
               </p:ext>
             </p:extLst>
           </p:nvPr>
         </p:nvGraphicFramePr>
         <p:xfrm>
           <a:off x="1200150" y="3657600"/>
-          <a:ext cx="2836740" cy="2136047"/>
+          <a:ext cx="3143250" cy="2136047"/>
         </p:xfrm>
         <a:graphic>
           <a:graphicData uri="http://schemas.openxmlformats.org/drawingml/2006/table">
@@ -28027,9 +28063,9 @@
                 <a:tableStyleId>{5C22544A-7EE6-4342-B048-85BDC9FD1C3A}</a:tableStyleId>
               </a:tblPr>
               <a:tblGrid>
-                <a:gridCol w="830502"/>
-                <a:gridCol w="1003119"/>
-                <a:gridCol w="1003119"/>
+                <a:gridCol w="920238"/>
+                <a:gridCol w="1111506"/>
+                <a:gridCol w="1111506"/>
               </a:tblGrid>
               <a:tr h="528506">
                 <a:tc>
@@ -28039,10 +28075,10 @@
                     <a:p>
                       <a:pPr algn="ctr"/>
                       <a:r>
-                        <a:rPr lang="en-US" sz="2000" dirty="0" smtClean="0"/>
+                        <a:rPr lang="en-US" sz="2400" dirty="0" smtClean="0"/>
                         <a:t>Class</a:t>
                       </a:r>
-                      <a:endParaRPr lang="en-US" sz="2000" dirty="0"/>
+                      <a:endParaRPr lang="en-US" sz="2400" dirty="0"/>
                     </a:p>
                   </a:txBody>
                   <a:tcPr/>
@@ -28070,10 +28106,10 @@
                         <a:defRPr/>
                       </a:pPr>
                       <a:r>
-                        <a:rPr lang="en-US" sz="2000" dirty="0" err="1" smtClean="0"/>
+                        <a:rPr lang="en-US" sz="2400" dirty="0" err="1" smtClean="0"/>
                         <a:t>foo$A</a:t>
                       </a:r>
-                      <a:endParaRPr lang="en-US" sz="2000" dirty="0" smtClean="0"/>
+                      <a:endParaRPr lang="en-US" sz="2400" dirty="0" smtClean="0"/>
                     </a:p>
                   </a:txBody>
                   <a:tcPr/>
@@ -28101,10 +28137,10 @@
                         <a:defRPr/>
                       </a:pPr>
                       <a:r>
-                        <a:rPr lang="en-US" sz="2000" dirty="0" err="1" smtClean="0"/>
+                        <a:rPr lang="en-US" sz="2400" dirty="0" err="1" smtClean="0"/>
                         <a:t>foo$B</a:t>
                       </a:r>
-                      <a:endParaRPr lang="en-US" sz="2000" dirty="0" smtClean="0"/>
+                      <a:endParaRPr lang="en-US" sz="2400" dirty="0" smtClean="0"/>
                     </a:p>
                   </a:txBody>
                   <a:tcPr/>
@@ -28118,10 +28154,10 @@
                     <a:p>
                       <a:pPr algn="ctr"/>
                       <a:r>
-                        <a:rPr lang="en-US" sz="2000" dirty="0" smtClean="0"/>
+                        <a:rPr lang="en-US" sz="2400" dirty="0" smtClean="0"/>
                         <a:t>A</a:t>
                       </a:r>
-                      <a:endParaRPr lang="en-US" sz="2000" dirty="0"/>
+                      <a:endParaRPr lang="en-US" sz="2400" dirty="0"/>
                     </a:p>
                   </a:txBody>
                   <a:tcPr/>
@@ -28133,10 +28169,10 @@
                     <a:p>
                       <a:pPr algn="ctr"/>
                       <a:r>
-                        <a:rPr lang="en-US" sz="2000" dirty="0" err="1" smtClean="0"/>
+                        <a:rPr lang="en-US" sz="2400" dirty="0" err="1" smtClean="0"/>
                         <a:t>foo@A</a:t>
                       </a:r>
-                      <a:endParaRPr lang="en-US" sz="2000" dirty="0"/>
+                      <a:endParaRPr lang="en-US" sz="2400" dirty="0"/>
                     </a:p>
                   </a:txBody>
                   <a:tcPr/>
@@ -28147,7 +28183,7 @@
                     <a:lstStyle/>
                     <a:p>
                       <a:pPr algn="ctr"/>
-                      <a:endParaRPr lang="en-US" sz="2000" dirty="0"/>
+                      <a:endParaRPr lang="en-US" sz="2400" dirty="0"/>
                     </a:p>
                   </a:txBody>
                   <a:tcPr/>
@@ -28161,10 +28197,10 @@
                     <a:p>
                       <a:pPr algn="ctr"/>
                       <a:r>
-                        <a:rPr lang="en-US" sz="2000" dirty="0" smtClean="0"/>
+                        <a:rPr lang="en-US" sz="2400" dirty="0" smtClean="0"/>
                         <a:t>B</a:t>
                       </a:r>
-                      <a:endParaRPr lang="en-US" sz="2000" dirty="0"/>
+                      <a:endParaRPr lang="en-US" sz="2400" dirty="0"/>
                     </a:p>
                   </a:txBody>
                   <a:tcPr/>
@@ -28175,7 +28211,7 @@
                     <a:lstStyle/>
                     <a:p>
                       <a:pPr algn="ctr"/>
-                      <a:endParaRPr lang="en-US" sz="2000" dirty="0"/>
+                      <a:endParaRPr lang="en-US" sz="2400" dirty="0"/>
                     </a:p>
                   </a:txBody>
                   <a:tcPr/>
@@ -28187,10 +28223,10 @@
                     <a:p>
                       <a:pPr algn="ctr"/>
                       <a:r>
-                        <a:rPr lang="en-US" sz="2000" dirty="0" err="1" smtClean="0"/>
+                        <a:rPr lang="en-US" sz="2400" dirty="0" err="1" smtClean="0"/>
                         <a:t>foo@B</a:t>
                       </a:r>
-                      <a:endParaRPr lang="en-US" sz="2000" dirty="0"/>
+                      <a:endParaRPr lang="en-US" sz="2400" dirty="0"/>
                     </a:p>
                   </a:txBody>
                   <a:tcPr/>
@@ -28204,10 +28240,10 @@
                     <a:p>
                       <a:pPr algn="ctr"/>
                       <a:r>
-                        <a:rPr lang="en-US" sz="2000" dirty="0" smtClean="0"/>
+                        <a:rPr lang="en-US" sz="2400" dirty="0" smtClean="0"/>
                         <a:t>C</a:t>
                       </a:r>
-                      <a:endParaRPr lang="en-US" sz="2000" dirty="0"/>
+                      <a:endParaRPr lang="en-US" sz="2400" dirty="0"/>
                     </a:p>
                   </a:txBody>
                   <a:tcPr/>
@@ -28235,10 +28271,10 @@
                         <a:defRPr/>
                       </a:pPr>
                       <a:r>
-                        <a:rPr lang="en-US" sz="2000" dirty="0" err="1" smtClean="0"/>
+                        <a:rPr lang="en-US" sz="2400" dirty="0" err="1" smtClean="0"/>
                         <a:t>foo@B</a:t>
                       </a:r>
-                      <a:endParaRPr lang="en-US" sz="2000" dirty="0" smtClean="0"/>
+                      <a:endParaRPr lang="en-US" sz="2400" dirty="0" smtClean="0"/>
                     </a:p>
                   </a:txBody>
                   <a:tcPr/>
@@ -28266,10 +28302,10 @@
                         <a:defRPr/>
                       </a:pPr>
                       <a:r>
-                        <a:rPr lang="en-US" sz="2000" dirty="0" err="1" smtClean="0"/>
+                        <a:rPr lang="en-US" sz="2400" dirty="0" err="1" smtClean="0"/>
                         <a:t>foo@B</a:t>
                       </a:r>
-                      <a:endParaRPr lang="en-US" sz="2000" dirty="0" smtClean="0"/>
+                      <a:endParaRPr lang="en-US" sz="2400" dirty="0" smtClean="0"/>
                     </a:p>
                   </a:txBody>
                   <a:tcPr/>

</xml_diff>

<commit_message>
STEP 2023 incidence matrix
</commit_message>
<xml_diff>
--- a/Docs/Incidence matrix and OOP.pptx
+++ b/Docs/Incidence matrix and OOP.pptx
@@ -985,7 +985,11 @@
           </a:r>
           <a:r>
             <a:rPr lang="en-US" sz="2800" dirty="0" smtClean="0"/>
-            <a:t> represents well the whole inheritance graph </a:t>
+            <a:t> represents well the whole inheritance </a:t>
+          </a:r>
+          <a:r>
+            <a:rPr lang="en-US" sz="2800" dirty="0" smtClean="0"/>
+            <a:t>graph. It is the central data structure for analysis and optimizations </a:t>
           </a:r>
           <a:endParaRPr lang="en-US" sz="2800" dirty="0"/>
         </a:p>
@@ -1022,10 +1026,22 @@
         <a:p>
           <a:pPr rtl="0"/>
           <a:r>
-            <a:rPr lang="en-US" sz="2800" smtClean="0"/>
-            <a:t>Classes numbering scheme based on the nature of the inheritance graph and origin&amp;seed numbering scheme based on the length of the column vectors delivers blocked matrix  which supports direct access with minimal memory losses to store empty cells</a:t>
+            <a:rPr lang="en-US" sz="2800" dirty="0" smtClean="0"/>
+            <a:t>Classes numbering scheme based on the nature of the inheritance graph and </a:t>
           </a:r>
-          <a:endParaRPr lang="en-US" sz="2800"/>
+          <a:r>
+            <a:rPr lang="en-US" sz="2800" dirty="0" err="1" smtClean="0"/>
+            <a:t>seed&amp;origin</a:t>
+          </a:r>
+          <a:r>
+            <a:rPr lang="en-US" sz="2800" dirty="0" smtClean="0"/>
+            <a:t> </a:t>
+          </a:r>
+          <a:r>
+            <a:rPr lang="en-US" sz="2800" dirty="0" smtClean="0"/>
+            <a:t>numbering scheme based on the length of the column vectors delivers blocked matrix  which supports direct access with minimal memory losses to store empty cells</a:t>
+          </a:r>
+          <a:endParaRPr lang="en-US" sz="2800" dirty="0"/>
         </a:p>
       </dgm:t>
     </dgm:pt>
@@ -1201,8 +1217,8 @@
       </dsp:nvSpPr>
       <dsp:spPr>
         <a:xfrm>
-          <a:off x="0" y="1116"/>
-          <a:ext cx="8839200" cy="1871542"/>
+          <a:off x="0" y="1562"/>
+          <a:ext cx="8839200" cy="1871114"/>
         </a:xfrm>
         <a:prstGeom prst="roundRect">
           <a:avLst/>
@@ -1270,14 +1286,18 @@
           </a:r>
           <a:r>
             <a:rPr lang="en-US" sz="2800" kern="1200" dirty="0" smtClean="0"/>
-            <a:t> represents well the whole inheritance graph </a:t>
+            <a:t> represents well the whole inheritance </a:t>
+          </a:r>
+          <a:r>
+            <a:rPr lang="en-US" sz="2800" kern="1200" dirty="0" smtClean="0"/>
+            <a:t>graph. It is the central data structure for analysis and optimizations </a:t>
           </a:r>
           <a:endParaRPr lang="en-US" sz="2800" kern="1200" dirty="0"/>
         </a:p>
       </dsp:txBody>
       <dsp:txXfrm>
-        <a:off x="91361" y="92477"/>
-        <a:ext cx="8656478" cy="1688820"/>
+        <a:off x="91340" y="92902"/>
+        <a:ext cx="8656520" cy="1688434"/>
       </dsp:txXfrm>
     </dsp:sp>
     <dsp:sp modelId="{15441772-0FB3-4C1D-BC00-0A59383FE339}">
@@ -1287,8 +1307,8 @@
       </dsp:nvSpPr>
       <dsp:spPr>
         <a:xfrm>
-          <a:off x="0" y="1883628"/>
-          <a:ext cx="8839200" cy="1871542"/>
+          <a:off x="0" y="1883842"/>
+          <a:ext cx="8839200" cy="1871114"/>
         </a:xfrm>
         <a:prstGeom prst="roundRect">
           <a:avLst/>
@@ -1347,15 +1367,27 @@
             </a:spcAft>
           </a:pPr>
           <a:r>
-            <a:rPr lang="en-US" sz="2800" kern="1200" smtClean="0"/>
-            <a:t>Classes numbering scheme based on the nature of the inheritance graph and origin&amp;seed numbering scheme based on the length of the column vectors delivers blocked matrix  which supports direct access with minimal memory losses to store empty cells</a:t>
+            <a:rPr lang="en-US" sz="2800" kern="1200" dirty="0" smtClean="0"/>
+            <a:t>Classes numbering scheme based on the nature of the inheritance graph and </a:t>
           </a:r>
-          <a:endParaRPr lang="en-US" sz="2800" kern="1200"/>
+          <a:r>
+            <a:rPr lang="en-US" sz="2800" kern="1200" dirty="0" err="1" smtClean="0"/>
+            <a:t>seed&amp;origin</a:t>
+          </a:r>
+          <a:r>
+            <a:rPr lang="en-US" sz="2800" kern="1200" dirty="0" smtClean="0"/>
+            <a:t> </a:t>
+          </a:r>
+          <a:r>
+            <a:rPr lang="en-US" sz="2800" kern="1200" dirty="0" smtClean="0"/>
+            <a:t>numbering scheme based on the length of the column vectors delivers blocked matrix  which supports direct access with minimal memory losses to store empty cells</a:t>
+          </a:r>
+          <a:endParaRPr lang="en-US" sz="2800" kern="1200" dirty="0"/>
         </a:p>
       </dsp:txBody>
       <dsp:txXfrm>
-        <a:off x="91361" y="1974989"/>
-        <a:ext cx="8656478" cy="1688820"/>
+        <a:off x="91340" y="1975182"/>
+        <a:ext cx="8656520" cy="1688434"/>
       </dsp:txXfrm>
     </dsp:sp>
     <dsp:sp modelId="{54F8F62F-36EA-47C6-8CAF-CA1D415EE2C1}">
@@ -1365,8 +1397,8 @@
       </dsp:nvSpPr>
       <dsp:spPr>
         <a:xfrm>
-          <a:off x="0" y="3766140"/>
-          <a:ext cx="8839200" cy="1871542"/>
+          <a:off x="0" y="3766122"/>
+          <a:ext cx="8839200" cy="1871114"/>
         </a:xfrm>
         <a:prstGeom prst="roundRect">
           <a:avLst/>
@@ -1432,8 +1464,8 @@
         </a:p>
       </dsp:txBody>
       <dsp:txXfrm>
-        <a:off x="91361" y="3857501"/>
-        <a:ext cx="8656478" cy="1688820"/>
+        <a:off x="91340" y="3857462"/>
+        <a:ext cx="8656520" cy="1688434"/>
       </dsp:txXfrm>
     </dsp:sp>
   </dsp:spTree>
@@ -6331,6 +6363,86 @@
           </a:prstGeom>
         </p:spPr>
       </p:pic>
+      <p:sp>
+        <p:nvSpPr>
+          <p:cNvPr id="3" name="TextBox 2"/>
+          <p:cNvSpPr txBox="1"/>
+          <p:nvPr/>
+        </p:nvSpPr>
+        <p:spPr>
+          <a:xfrm>
+            <a:off x="2057400" y="381000"/>
+            <a:ext cx="7018590" cy="707886"/>
+          </a:xfrm>
+          <a:prstGeom prst="rect">
+            <a:avLst/>
+          </a:prstGeom>
+          <a:noFill/>
+          <a:ln>
+            <a:solidFill>
+              <a:srgbClr val="C00000"/>
+            </a:solidFill>
+            <a:prstDash val="sysDot"/>
+          </a:ln>
+        </p:spPr>
+        <p:txBody>
+          <a:bodyPr wrap="square" rtlCol="0">
+            <a:spAutoFit/>
+          </a:bodyPr>
+          <a:lstStyle/>
+          <a:p>
+            <a:r>
+              <a:rPr lang="en-US" sz="2000" dirty="0" smtClean="0"/>
+              <a:t>From: “</a:t>
+            </a:r>
+            <a:r>
+              <a:rPr lang="ru-RU" sz="2000" dirty="0" smtClean="0"/>
+              <a:t>Это все придумал </a:t>
+            </a:r>
+            <a:r>
+              <a:rPr lang="ru-RU" sz="2000" dirty="0" err="1" smtClean="0"/>
+              <a:t>Черчиль</a:t>
+            </a:r>
+            <a:r>
+              <a:rPr lang="ru-RU" sz="2000" dirty="0" smtClean="0"/>
+              <a:t> в 18 году</a:t>
+            </a:r>
+            <a:r>
+              <a:rPr lang="en-US" sz="2000" dirty="0" smtClean="0"/>
+              <a:t>”</a:t>
+            </a:r>
+            <a:r>
+              <a:rPr lang="ru-RU" sz="2000" dirty="0" smtClean="0"/>
+              <a:t> (С) Высоцкий В.С</a:t>
+            </a:r>
+          </a:p>
+          <a:p>
+            <a:r>
+              <a:rPr lang="en-US" sz="2000" dirty="0" smtClean="0"/>
+              <a:t>To: “</a:t>
+            </a:r>
+            <a:r>
+              <a:rPr lang="ru-RU" sz="2000" dirty="0" smtClean="0"/>
+              <a:t>Это все придумал Мейер в 85 году</a:t>
+            </a:r>
+            <a:r>
+              <a:rPr lang="en-US" sz="2000" dirty="0" smtClean="0"/>
+              <a:t>” </a:t>
+            </a:r>
+            <a:r>
+              <a:rPr lang="en-US" sz="2000" dirty="0" smtClean="0">
+                <a:sym typeface="Wingdings" panose="05000000000000000000" pitchFamily="2" charset="2"/>
+              </a:rPr>
+              <a:t></a:t>
+            </a:r>
+            <a:r>
+              <a:rPr lang="ru-RU" sz="2000" dirty="0" smtClean="0"/>
+              <a:t> </a:t>
+            </a:r>
+            <a:endParaRPr lang="en-US" sz="2000" dirty="0"/>
+          </a:p>
+        </p:txBody>
+      </p:sp>
     </p:spTree>
     <p:extLst>
       <p:ext uri="{BB962C8B-B14F-4D97-AF65-F5344CB8AC3E}">
@@ -11178,13 +11290,13 @@
               <a:t>General </a:t>
             </a:r>
             <a:r>
-              <a:rPr lang="en-US" sz="3600" b="1" dirty="0" err="1" smtClean="0">
+              <a:rPr lang="en-US" sz="3600" b="1" dirty="0" smtClean="0">
                 <a:solidFill>
                   <a:srgbClr val="CC6600"/>
                 </a:solidFill>
                 <a:latin typeface="Comic Sans MS" pitchFamily="66" charset="0"/>
               </a:rPr>
-              <a:t>algorithm:steps</a:t>
+              <a:t>algorithm: steps</a:t>
             </a:r>
             <a:endParaRPr lang="en-US" sz="3600" b="1" dirty="0">
               <a:solidFill>
@@ -22956,6 +23068,40 @@
           </a:p>
         </p:txBody>
       </p:sp>
+      <p:sp>
+        <p:nvSpPr>
+          <p:cNvPr id="4" name="TextBox 3"/>
+          <p:cNvSpPr txBox="1"/>
+          <p:nvPr/>
+        </p:nvSpPr>
+        <p:spPr>
+          <a:xfrm>
+            <a:off x="533400" y="4953000"/>
+            <a:ext cx="7848600" cy="707886"/>
+          </a:xfrm>
+          <a:prstGeom prst="rect">
+            <a:avLst/>
+          </a:prstGeom>
+          <a:noFill/>
+        </p:spPr>
+        <p:txBody>
+          <a:bodyPr wrap="square" rtlCol="0">
+            <a:spAutoFit/>
+          </a:bodyPr>
+          <a:lstStyle/>
+          <a:p>
+            <a:r>
+              <a:rPr lang="en-US" sz="2000" u="sng" dirty="0" smtClean="0"/>
+              <a:t>Disclaimer:</a:t>
+            </a:r>
+            <a:r>
+              <a:rPr lang="en-US" sz="2000" dirty="0" smtClean="0"/>
+              <a:t> not all topics are fully investigated and some are partially covered. Separate talks may be provided to cover</a:t>
+            </a:r>
+            <a:endParaRPr lang="en-US" sz="2000" dirty="0"/>
+          </a:p>
+        </p:txBody>
+      </p:sp>
     </p:spTree>
     <p:extLst>
       <p:ext uri="{BB962C8B-B14F-4D97-AF65-F5344CB8AC3E}">
@@ -23071,13 +23217,13 @@
             <p:ph idx="1"/>
             <p:extLst>
               <p:ext uri="{D42A27DB-BD31-4B8C-83A1-F6EECF244321}">
-                <p14:modId xmlns:p14="http://schemas.microsoft.com/office/powerpoint/2010/main" val="3295912647"/>
+                <p14:modId xmlns:p14="http://schemas.microsoft.com/office/powerpoint/2010/main" val="3361164604"/>
               </p:ext>
             </p:extLst>
           </p:nvPr>
         </p:nvGraphicFramePr>
         <p:xfrm>
-          <a:off x="228600" y="762000"/>
+          <a:off x="152400" y="990600"/>
           <a:ext cx="8839200" cy="5638800"/>
         </p:xfrm>
         <a:graphic>
@@ -23690,12 +23836,8 @@
               <a:t> believes. </a:t>
             </a:r>
             <a:r>
-              <a:rPr lang="en-US" sz="2400" u="sng" dirty="0" smtClean="0"/>
-              <a:t>I am stubborn</a:t>
-            </a:r>
-            <a:r>
-              <a:rPr lang="en-US" sz="2400" dirty="0" smtClean="0"/>
-              <a:t> </a:t>
+              <a:rPr lang="ru-RU" sz="2400" u="sng" dirty="0" smtClean="0"/>
+              <a:t>А баба Яга против</a:t>
             </a:r>
             <a:r>
               <a:rPr lang="en-US" sz="2400" dirty="0" smtClean="0">
@@ -23707,6 +23849,7 @@
               <a:rPr lang="en-US" sz="2400" dirty="0" smtClean="0"/>
               <a:t> </a:t>
             </a:r>
+            <a:endParaRPr lang="en-US" sz="2400" dirty="0" smtClean="0"/>
           </a:p>
           <a:p>
             <a:pPr marL="0" indent="0">
@@ -23957,8 +24100,21 @@
             </a:r>
             <a:r>
               <a:rPr lang="en-US" sz="2400" dirty="0" smtClean="0"/>
-              <a:t> is the initial member declaration in the origin</a:t>
-            </a:r>
+              <a:t> is the initial member declaration in the </a:t>
+            </a:r>
+            <a:r>
+              <a:rPr lang="en-US" sz="2400" dirty="0" smtClean="0"/>
+              <a:t>origin</a:t>
+            </a:r>
+            <a:r>
+              <a:rPr lang="ru-RU" sz="2400" dirty="0" smtClean="0"/>
+              <a:t> </a:t>
+            </a:r>
+            <a:r>
+              <a:rPr lang="en-US" sz="2400" dirty="0" smtClean="0"/>
+              <a:t>class</a:t>
+            </a:r>
+            <a:endParaRPr lang="en-US" sz="2400" dirty="0" smtClean="0"/>
           </a:p>
           <a:p>
             <a:pPr marL="285750" indent="-285750"/>

</xml_diff>